<commit_message>
Remove duplicated code in XmlRecentBooksStorage, update class diagram
</commit_message>
<xml_diff>
--- a/docs/diagrams/StorageComponentClassDiagram.pptx
+++ b/docs/diagrams/StorageComponentClassDiagram.pptx
@@ -208,7 +208,7 @@
           <a:p>
             <a:fld id="{F5CC4B3F-88C1-4FFA-B1B6-F41C21DC6924}" type="datetimeFigureOut">
               <a:rPr lang="en-US" smtClean="0"/>
-              <a:t>4/10/2018</a:t>
+              <a:t>4/11/2018</a:t>
             </a:fld>
             <a:endParaRPr lang="en-US"/>
           </a:p>
@@ -654,7 +654,7 @@
           <a:p>
             <a:fld id="{78C97017-6FC3-485B-9764-EAC9E56C1D49}" type="datetimeFigureOut">
               <a:rPr lang="en-US" smtClean="0"/>
-              <a:t>4/10/2018</a:t>
+              <a:t>4/11/2018</a:t>
             </a:fld>
             <a:endParaRPr lang="en-US"/>
           </a:p>
@@ -822,7 +822,7 @@
           <a:p>
             <a:fld id="{78C97017-6FC3-485B-9764-EAC9E56C1D49}" type="datetimeFigureOut">
               <a:rPr lang="en-US" smtClean="0"/>
-              <a:t>4/10/2018</a:t>
+              <a:t>4/11/2018</a:t>
             </a:fld>
             <a:endParaRPr lang="en-US"/>
           </a:p>
@@ -1000,7 +1000,7 @@
           <a:p>
             <a:fld id="{78C97017-6FC3-485B-9764-EAC9E56C1D49}" type="datetimeFigureOut">
               <a:rPr lang="en-US" smtClean="0"/>
-              <a:t>4/10/2018</a:t>
+              <a:t>4/11/2018</a:t>
             </a:fld>
             <a:endParaRPr lang="en-US"/>
           </a:p>
@@ -1168,7 +1168,7 @@
           <a:p>
             <a:fld id="{78C97017-6FC3-485B-9764-EAC9E56C1D49}" type="datetimeFigureOut">
               <a:rPr lang="en-US" smtClean="0"/>
-              <a:t>4/10/2018</a:t>
+              <a:t>4/11/2018</a:t>
             </a:fld>
             <a:endParaRPr lang="en-US"/>
           </a:p>
@@ -1413,7 +1413,7 @@
           <a:p>
             <a:fld id="{78C97017-6FC3-485B-9764-EAC9E56C1D49}" type="datetimeFigureOut">
               <a:rPr lang="en-US" smtClean="0"/>
-              <a:t>4/10/2018</a:t>
+              <a:t>4/11/2018</a:t>
             </a:fld>
             <a:endParaRPr lang="en-US"/>
           </a:p>
@@ -1698,7 +1698,7 @@
           <a:p>
             <a:fld id="{78C97017-6FC3-485B-9764-EAC9E56C1D49}" type="datetimeFigureOut">
               <a:rPr lang="en-US" smtClean="0"/>
-              <a:t>4/10/2018</a:t>
+              <a:t>4/11/2018</a:t>
             </a:fld>
             <a:endParaRPr lang="en-US"/>
           </a:p>
@@ -2117,7 +2117,7 @@
           <a:p>
             <a:fld id="{78C97017-6FC3-485B-9764-EAC9E56C1D49}" type="datetimeFigureOut">
               <a:rPr lang="en-US" smtClean="0"/>
-              <a:t>4/10/2018</a:t>
+              <a:t>4/11/2018</a:t>
             </a:fld>
             <a:endParaRPr lang="en-US"/>
           </a:p>
@@ -2234,7 +2234,7 @@
           <a:p>
             <a:fld id="{78C97017-6FC3-485B-9764-EAC9E56C1D49}" type="datetimeFigureOut">
               <a:rPr lang="en-US" smtClean="0"/>
-              <a:t>4/10/2018</a:t>
+              <a:t>4/11/2018</a:t>
             </a:fld>
             <a:endParaRPr lang="en-US"/>
           </a:p>
@@ -2329,7 +2329,7 @@
           <a:p>
             <a:fld id="{78C97017-6FC3-485B-9764-EAC9E56C1D49}" type="datetimeFigureOut">
               <a:rPr lang="en-US" smtClean="0"/>
-              <a:t>4/10/2018</a:t>
+              <a:t>4/11/2018</a:t>
             </a:fld>
             <a:endParaRPr lang="en-US"/>
           </a:p>
@@ -2604,7 +2604,7 @@
           <a:p>
             <a:fld id="{78C97017-6FC3-485B-9764-EAC9E56C1D49}" type="datetimeFigureOut">
               <a:rPr lang="en-US" smtClean="0"/>
-              <a:t>4/10/2018</a:t>
+              <a:t>4/11/2018</a:t>
             </a:fld>
             <a:endParaRPr lang="en-US"/>
           </a:p>
@@ -2856,7 +2856,7 @@
           <a:p>
             <a:fld id="{78C97017-6FC3-485B-9764-EAC9E56C1D49}" type="datetimeFigureOut">
               <a:rPr lang="en-US" smtClean="0"/>
-              <a:t>4/10/2018</a:t>
+              <a:t>4/11/2018</a:t>
             </a:fld>
             <a:endParaRPr lang="en-US"/>
           </a:p>
@@ -3067,7 +3067,7 @@
           <a:p>
             <a:fld id="{78C97017-6FC3-485B-9764-EAC9E56C1D49}" type="datetimeFigureOut">
               <a:rPr lang="en-US" smtClean="0"/>
-              <a:t>4/10/2018</a:t>
+              <a:t>4/11/2018</a:t>
             </a:fld>
             <a:endParaRPr lang="en-US"/>
           </a:p>
@@ -3451,7 +3451,7 @@
         <p:spPr>
           <a:xfrm>
             <a:off x="1119865" y="2288860"/>
-            <a:ext cx="7871735" cy="2352600"/>
+            <a:ext cx="7871735" cy="2508880"/>
           </a:xfrm>
           <a:prstGeom prst="roundRect">
             <a:avLst>
@@ -3593,8 +3593,8 @@
         </p:nvSpPr>
         <p:spPr>
           <a:xfrm rot="16200000">
-            <a:off x="1336666" y="3391389"/>
-            <a:ext cx="1788230" cy="346760"/>
+            <a:off x="1234454" y="3493601"/>
+            <a:ext cx="1992654" cy="346760"/>
           </a:xfrm>
           <a:prstGeom prst="rect">
             <a:avLst/>
@@ -3656,8 +3656,8 @@
         </p:nvSpPr>
         <p:spPr>
           <a:xfrm rot="16200000">
-            <a:off x="608904" y="3391388"/>
-            <a:ext cx="1788231" cy="346760"/>
+            <a:off x="506692" y="3493600"/>
+            <a:ext cx="1992655" cy="346760"/>
           </a:xfrm>
           <a:prstGeom prst="rect">
             <a:avLst/>
@@ -4906,7 +4906,7 @@
         </p:nvSpPr>
         <p:spPr>
           <a:xfrm>
-            <a:off x="4618128" y="3605576"/>
+            <a:off x="4618128" y="3810000"/>
             <a:ext cx="1169835" cy="346760"/>
           </a:xfrm>
           <a:prstGeom prst="rect">
@@ -4970,7 +4970,7 @@
         </p:nvCxnSpPr>
         <p:spPr>
           <a:xfrm flipV="1">
-            <a:off x="4394804" y="3768554"/>
+            <a:off x="4394804" y="3972978"/>
             <a:ext cx="223324" cy="1"/>
           </a:xfrm>
           <a:prstGeom prst="bentConnector3">
@@ -5019,7 +5019,7 @@
         </p:nvSpPr>
         <p:spPr>
           <a:xfrm rot="5400000" flipV="1">
-            <a:off x="4171790" y="3680793"/>
+            <a:off x="4171790" y="3885217"/>
             <a:ext cx="270504" cy="175523"/>
           </a:xfrm>
           <a:prstGeom prst="triangle">
@@ -5080,7 +5080,7 @@
         </p:nvSpPr>
         <p:spPr>
           <a:xfrm>
-            <a:off x="2873942" y="3647833"/>
+            <a:off x="2873942" y="3852257"/>
             <a:ext cx="1323049" cy="346760"/>
           </a:xfrm>
           <a:prstGeom prst="rect">
@@ -5166,7 +5166,7 @@
         </p:nvCxnSpPr>
         <p:spPr>
           <a:xfrm>
-            <a:off x="2640209" y="3817117"/>
+            <a:off x="2640209" y="4021541"/>
             <a:ext cx="220810" cy="5284"/>
           </a:xfrm>
           <a:prstGeom prst="straightConnector1">
@@ -5212,7 +5212,7 @@
         </p:nvSpPr>
         <p:spPr>
           <a:xfrm>
-            <a:off x="2404161" y="3730427"/>
+            <a:off x="2404161" y="3934851"/>
             <a:ext cx="236048" cy="173380"/>
           </a:xfrm>
           <a:prstGeom prst="flowChartDecision">
@@ -5255,57 +5255,6 @@
           </a:p>
         </p:txBody>
       </p:sp>
-      <p:cxnSp>
-        <p:nvCxnSpPr>
-          <p:cNvPr id="38" name="Elbow Connector 122">
-            <a:extLst>
-              <a:ext uri="{FF2B5EF4-FFF2-40B4-BE49-F238E27FC236}">
-                <a16:creationId xmlns:a16="http://schemas.microsoft.com/office/drawing/2014/main" id="{B81A2D30-EA64-43DD-A9E2-99BD68B4BA5F}"/>
-              </a:ext>
-            </a:extLst>
-          </p:cNvPr>
-          <p:cNvCxnSpPr>
-            <a:cxnSpLocks/>
-            <a:stCxn id="28" idx="3"/>
-            <a:endCxn id="66" idx="2"/>
-          </p:cNvCxnSpPr>
-          <p:nvPr/>
-        </p:nvCxnSpPr>
-        <p:spPr>
-          <a:xfrm flipV="1">
-            <a:off x="5787963" y="3507170"/>
-            <a:ext cx="905088" cy="271786"/>
-          </a:xfrm>
-          <a:prstGeom prst="bentConnector2">
-            <a:avLst/>
-          </a:prstGeom>
-          <a:ln w="19050">
-            <a:solidFill>
-              <a:schemeClr val="accent6">
-                <a:lumMod val="75000"/>
-              </a:schemeClr>
-            </a:solidFill>
-            <a:prstDash val="sysDot"/>
-            <a:headEnd type="none" w="med" len="med"/>
-            <a:tailEnd type="arrow" w="med" len="med"/>
-          </a:ln>
-          <a:effectLst/>
-        </p:spPr>
-        <p:style>
-          <a:lnRef idx="1">
-            <a:schemeClr val="accent2"/>
-          </a:lnRef>
-          <a:fillRef idx="2">
-            <a:schemeClr val="accent2"/>
-          </a:fillRef>
-          <a:effectRef idx="1">
-            <a:schemeClr val="accent2"/>
-          </a:effectRef>
-          <a:fontRef idx="minor">
-            <a:schemeClr val="dk1"/>
-          </a:fontRef>
-        </p:style>
-      </p:cxnSp>
       <p:sp>
         <p:nvSpPr>
           <p:cNvPr id="35" name="Rectangle 8">
@@ -5320,7 +5269,7 @@
         </p:nvSpPr>
         <p:spPr>
           <a:xfrm>
-            <a:off x="2873942" y="4118190"/>
+            <a:off x="2873942" y="4322614"/>
             <a:ext cx="1323049" cy="346760"/>
           </a:xfrm>
           <a:prstGeom prst="rect">
@@ -5406,7 +5355,7 @@
         </p:nvCxnSpPr>
         <p:spPr>
           <a:xfrm>
-            <a:off x="2640209" y="4287474"/>
+            <a:off x="2640209" y="4491898"/>
             <a:ext cx="220810" cy="5284"/>
           </a:xfrm>
           <a:prstGeom prst="straightConnector1">
@@ -5452,7 +5401,7 @@
         </p:nvSpPr>
         <p:spPr>
           <a:xfrm>
-            <a:off x="2404161" y="4200784"/>
+            <a:off x="2404161" y="4405208"/>
             <a:ext cx="236048" cy="173380"/>
           </a:xfrm>
           <a:prstGeom prst="flowChartDecision">
@@ -5512,7 +5461,7 @@
         </p:nvCxnSpPr>
         <p:spPr>
           <a:xfrm flipV="1">
-            <a:off x="4392303" y="4287474"/>
+            <a:off x="4392303" y="4491898"/>
             <a:ext cx="223324" cy="1"/>
           </a:xfrm>
           <a:prstGeom prst="bentConnector3">
@@ -5561,7 +5510,7 @@
         </p:nvSpPr>
         <p:spPr>
           <a:xfrm rot="5400000" flipV="1">
-            <a:off x="4169289" y="4199713"/>
+            <a:off x="4169289" y="4404137"/>
             <a:ext cx="270504" cy="175523"/>
           </a:xfrm>
           <a:prstGeom prst="triangle">
@@ -5622,7 +5571,7 @@
         </p:nvSpPr>
         <p:spPr>
           <a:xfrm>
-            <a:off x="4615627" y="4114094"/>
+            <a:off x="4615627" y="4318518"/>
             <a:ext cx="1169835" cy="346760"/>
           </a:xfrm>
           <a:prstGeom prst="rect">
@@ -5706,7 +5655,7 @@
         </p:nvCxnSpPr>
         <p:spPr>
           <a:xfrm>
-            <a:off x="5791200" y="4285504"/>
+            <a:off x="5791200" y="4489928"/>
             <a:ext cx="381000" cy="1970"/>
           </a:xfrm>
           <a:prstGeom prst="bentConnector3">
@@ -5755,7 +5704,7 @@
         </p:nvSpPr>
         <p:spPr>
           <a:xfrm>
-            <a:off x="6172200" y="4114094"/>
+            <a:off x="6172200" y="4318518"/>
             <a:ext cx="1041701" cy="346760"/>
           </a:xfrm>
           <a:prstGeom prst="rect">
@@ -5817,7 +5766,7 @@
         </p:nvSpPr>
         <p:spPr>
           <a:xfrm>
-            <a:off x="7615738" y="4112124"/>
+            <a:off x="7615738" y="4316548"/>
             <a:ext cx="1259718" cy="346760"/>
           </a:xfrm>
           <a:prstGeom prst="rect">
@@ -5882,7 +5831,7 @@
         </p:nvCxnSpPr>
         <p:spPr>
           <a:xfrm flipV="1">
-            <a:off x="7213901" y="4285504"/>
+            <a:off x="7213901" y="4489928"/>
             <a:ext cx="401837" cy="786"/>
           </a:xfrm>
           <a:prstGeom prst="bentConnector3">
@@ -5906,6 +5855,59 @@
           </a:fillRef>
           <a:effectRef idx="1">
             <a:schemeClr val="accent6"/>
+          </a:effectRef>
+          <a:fontRef idx="minor">
+            <a:schemeClr val="dk1"/>
+          </a:fontRef>
+        </p:style>
+      </p:cxnSp>
+      <p:cxnSp>
+        <p:nvCxnSpPr>
+          <p:cNvPr id="57" name="Elbow Connector 122">
+            <a:extLst>
+              <a:ext uri="{FF2B5EF4-FFF2-40B4-BE49-F238E27FC236}">
+                <a16:creationId xmlns:a16="http://schemas.microsoft.com/office/drawing/2014/main" id="{C4E90F83-1DE6-4EB5-BCBF-1554A2EC4F28}"/>
+              </a:ext>
+            </a:extLst>
+          </p:cNvPr>
+          <p:cNvCxnSpPr>
+            <a:cxnSpLocks/>
+            <a:stCxn id="28" idx="0"/>
+            <a:endCxn id="50" idx="2"/>
+          </p:cNvCxnSpPr>
+          <p:nvPr/>
+        </p:nvCxnSpPr>
+        <p:spPr>
+          <a:xfrm rot="5400000" flipH="1" flipV="1">
+            <a:off x="5052264" y="3655982"/>
+            <a:ext cx="304800" cy="3237"/>
+          </a:xfrm>
+          <a:prstGeom prst="bentConnector3">
+            <a:avLst>
+              <a:gd name="adj1" fmla="val 50000"/>
+            </a:avLst>
+          </a:prstGeom>
+          <a:ln w="19050">
+            <a:solidFill>
+              <a:schemeClr val="accent6">
+                <a:lumMod val="75000"/>
+              </a:schemeClr>
+            </a:solidFill>
+            <a:prstDash val="sysDot"/>
+            <a:headEnd type="none" w="med" len="med"/>
+            <a:tailEnd type="arrow" w="med" len="med"/>
+          </a:ln>
+          <a:effectLst/>
+        </p:spPr>
+        <p:style>
+          <a:lnRef idx="1">
+            <a:schemeClr val="accent2"/>
+          </a:lnRef>
+          <a:fillRef idx="2">
+            <a:schemeClr val="accent2"/>
+          </a:fillRef>
+          <a:effectRef idx="1">
+            <a:schemeClr val="accent2"/>
           </a:effectRef>
           <a:fontRef idx="minor">
             <a:schemeClr val="dk1"/>

</xml_diff>